<commit_message>
ppt generation by replacing data
</commit_message>
<xml_diff>
--- a/scripts/ppt_generation/test.pptx
+++ b/scripts/ppt_generation/test.pptx
@@ -6,6 +6,12 @@
   </p:sldMasterIdLst>
   <p:sldIdLst>
     <p:sldId id="256" r:id="rId7"/>
+    <p:sldId id="257" r:id="rId8"/>
+    <p:sldId id="258" r:id="rId9"/>
+    <p:sldId id="259" r:id="rId10"/>
+    <p:sldId id="260" r:id="rId11"/>
+    <p:sldId id="261" r:id="rId12"/>
+    <p:sldId id="262" r:id="rId13"/>
   </p:sldIdLst>
   <p:sldSz cx="9144000" cy="6858000" type="screen4x3"/>
   <p:notesSz cx="6858000" cy="9144000"/>
@@ -204,13 +210,13 @@
                 <c:formatCode>General</c:formatCode>
                 <c:ptCount val="3"/>
                 <c:pt idx="0">
-                  <c:v>22.3</c:v>
+                  <c:v>-22.3</c:v>
                 </c:pt>
                 <c:pt idx="1">
-                  <c:v>28.6</c:v>
+                  <c:v>-28.6</c:v>
                 </c:pt>
                 <c:pt idx="2">
-                  <c:v>15.2</c:v>
+                  <c:v>-15.2</c:v>
                 </c:pt>
               </c:numCache>
             </c:numRef>
@@ -342,13 +348,11 @@
 
 <file path=ppt/charts/chart2.xml><?xml version="1.0" encoding="utf-8"?>
 <c:chartSpace xmlns:c="http://schemas.openxmlformats.org/drawingml/2006/chart" xmlns:a="http://schemas.openxmlformats.org/drawingml/2006/main" xmlns:r="http://schemas.openxmlformats.org/officeDocument/2006/relationships">
-  <c:date1904 val="0"/>
   <c:chart>
     <c:autoTitleDeleted val="0"/>
     <c:plotArea>
-      <c:lineChart>
-        <c:grouping val="standard"/>
-        <c:varyColors val="0"/>
+      <c:pieChart>
+        <c:varyColors val="1"/>
         <c:ser>
           <c:idx val="0"/>
           <c:order val="0"/>
@@ -358,256 +362,77 @@
               <c:strCache>
                 <c:ptCount val="1"/>
                 <c:pt idx="0">
-                  <c:v>Q1 Sales</c:v>
+                  <c:v>Series 1</c:v>
                 </c:pt>
               </c:strCache>
             </c:strRef>
           </c:tx>
-          <c:marker>
-            <c:symbol val="none"/>
-          </c:marker>
           <c:cat>
             <c:strRef>
-              <c:f>Sheet1!$A$2:$A$4</c:f>
+              <c:f>Sheet1!$A$2:$A$6</c:f>
               <c:strCache>
-                <c:ptCount val="3"/>
+                <c:ptCount val="5"/>
                 <c:pt idx="0">
-                  <c:v>A</c:v>
+                  <c:v>West</c:v>
                 </c:pt>
                 <c:pt idx="1">
-                  <c:v>B</c:v>
+                  <c:v>East</c:v>
                 </c:pt>
                 <c:pt idx="2">
-                  <c:v>C</c:v>
+                  <c:v>North</c:v>
+                </c:pt>
+                <c:pt idx="3">
+                  <c:v>South</c:v>
+                </c:pt>
+                <c:pt idx="4">
+                  <c:v>Other</c:v>
                 </c:pt>
               </c:strCache>
             </c:strRef>
           </c:cat>
           <c:val>
             <c:numRef>
-              <c:f>Sheet1!$B$2:$B$4</c:f>
+              <c:f>Sheet1!$B$2:$B$6</c:f>
               <c:numCache>
                 <c:formatCode>General</c:formatCode>
-                <c:ptCount val="3"/>
+                <c:ptCount val="5"/>
                 <c:pt idx="0">
-                  <c:v>19.2</c:v>
+                  <c:v>0.135</c:v>
                 </c:pt>
                 <c:pt idx="1">
-                  <c:v>21.4</c:v>
+                  <c:v>0.324</c:v>
                 </c:pt>
                 <c:pt idx="2">
-                  <c:v>16.7</c:v>
+                  <c:v>0.18</c:v>
+                </c:pt>
+                <c:pt idx="3">
+                  <c:v>0.235</c:v>
+                </c:pt>
+                <c:pt idx="4">
+                  <c:v>0.126</c:v>
                 </c:pt>
               </c:numCache>
             </c:numRef>
           </c:val>
-          <c:smooth val="0"/>
         </c:ser>
-        <c:ser>
-          <c:idx val="1"/>
-          <c:order val="1"/>
-          <c:tx>
-            <c:strRef>
-              <c:f>Sheet1!$C$1</c:f>
-              <c:strCache>
-                <c:ptCount val="1"/>
-                <c:pt idx="0">
-                  <c:v>Q2 Sales</c:v>
-                </c:pt>
-              </c:strCache>
-            </c:strRef>
-          </c:tx>
-          <c:marker>
-            <c:symbol val="none"/>
-          </c:marker>
-          <c:cat>
-            <c:strRef>
-              <c:f>Sheet1!$A$2:$A$4</c:f>
-              <c:strCache>
-                <c:ptCount val="3"/>
-                <c:pt idx="0">
-                  <c:v>A</c:v>
-                </c:pt>
-                <c:pt idx="1">
-                  <c:v>B</c:v>
-                </c:pt>
-                <c:pt idx="2">
-                  <c:v>C</c:v>
-                </c:pt>
-              </c:strCache>
-            </c:strRef>
-          </c:cat>
-          <c:val>
-            <c:numRef>
-              <c:f>Sheet1!$C$2:$C$4</c:f>
-              <c:numCache>
-                <c:formatCode>General</c:formatCode>
-                <c:ptCount val="3"/>
-                <c:pt idx="0">
-                  <c:v>22.3</c:v>
-                </c:pt>
-                <c:pt idx="1">
-                  <c:v>28.6</c:v>
-                </c:pt>
-                <c:pt idx="2">
-                  <c:v>15.2</c:v>
-                </c:pt>
-              </c:numCache>
-            </c:numRef>
-          </c:val>
-          <c:smooth val="0"/>
-        </c:ser>
-        <c:ser>
-          <c:idx val="2"/>
-          <c:order val="2"/>
-          <c:tx>
-            <c:strRef>
-              <c:f>Sheet1!$D$1</c:f>
-              <c:strCache>
-                <c:ptCount val="1"/>
-                <c:pt idx="0">
-                  <c:v>Q3 Sales</c:v>
-                </c:pt>
-              </c:strCache>
-            </c:strRef>
-          </c:tx>
-          <c:marker>
-            <c:symbol val="none"/>
-          </c:marker>
-          <c:cat>
-            <c:strRef>
-              <c:f>Sheet1!$A$2:$A$4</c:f>
-              <c:strCache>
-                <c:ptCount val="3"/>
-                <c:pt idx="0">
-                  <c:v>A</c:v>
-                </c:pt>
-                <c:pt idx="1">
-                  <c:v>B</c:v>
-                </c:pt>
-                <c:pt idx="2">
-                  <c:v>C</c:v>
-                </c:pt>
-              </c:strCache>
-            </c:strRef>
-          </c:cat>
-          <c:val>
-            <c:numRef>
-              <c:f>Sheet1!$D$2:$D$4</c:f>
-              <c:numCache>
-                <c:formatCode>General</c:formatCode>
-                <c:ptCount val="3"/>
-                <c:pt idx="0">
-                  <c:v>20.4</c:v>
-                </c:pt>
-                <c:pt idx="1">
-                  <c:v>26.3</c:v>
-                </c:pt>
-                <c:pt idx="2">
-                  <c:v>14.2</c:v>
-                </c:pt>
-              </c:numCache>
-            </c:numRef>
-          </c:val>
-          <c:smooth val="0"/>
-        </c:ser>
-        <c:ser>
-          <c:idx val="3"/>
-          <c:order val="3"/>
-          <c:tx>
-            <c:strRef>
-              <c:f>Sheet1!$E$1</c:f>
-              <c:strCache>
-                <c:ptCount val="1"/>
-                <c:pt idx="0">
-                  <c:v>Sales</c:v>
-                </c:pt>
-              </c:strCache>
-            </c:strRef>
-          </c:tx>
-          <c:marker>
-            <c:symbol val="none"/>
-          </c:marker>
-          <c:cat>
-            <c:strRef>
-              <c:f>Sheet1!$A$2:$A$4</c:f>
-              <c:strCache>
-                <c:ptCount val="3"/>
-                <c:pt idx="0">
-                  <c:v>A</c:v>
-                </c:pt>
-                <c:pt idx="1">
-                  <c:v>B</c:v>
-                </c:pt>
-                <c:pt idx="2">
-                  <c:v>C</c:v>
-                </c:pt>
-              </c:strCache>
-            </c:strRef>
-          </c:cat>
-          <c:val>
-            <c:numRef>
-              <c:f>Sheet1!$E$2:$E$4</c:f>
-              <c:numCache>
-                <c:formatCode>General</c:formatCode>
-                <c:ptCount val="3"/>
-                <c:pt idx="0">
-                  <c:v>2245</c:v>
-                </c:pt>
-                <c:pt idx="1">
-                  <c:v>2856</c:v>
-                </c:pt>
-                <c:pt idx="2">
-                  <c:v>1545</c:v>
-                </c:pt>
-              </c:numCache>
-            </c:numRef>
-          </c:val>
-          <c:smooth val="0"/>
-        </c:ser>
-        <c:marker val="1"/>
-        <c:smooth val="0"/>
-        <c:axId val="2118791784"/>
-        <c:axId val="2140495176"/>
-      </c:lineChart>
-      <c:catAx>
-        <c:axId val="2118791784"/>
-        <c:scaling>
-          <c:orientation val="minMax"/>
-        </c:scaling>
-        <c:delete val="0"/>
-        <c:axPos val="b"/>
-        <c:majorTickMark val="out"/>
-        <c:minorTickMark val="none"/>
-        <c:tickLblPos val="nextTo"/>
-        <c:crossAx val="2140495176"/>
-        <c:crosses val="autoZero"/>
-        <c:auto val="1"/>
-        <c:lblAlgn val="ctr"/>
-        <c:lblOffset val="100"/>
-        <c:noMultiLvlLbl val="0"/>
-      </c:catAx>
-      <c:valAx>
-        <c:axId val="2140495176"/>
-        <c:scaling/>
-        <c:delete val="0"/>
-        <c:axPos val="l"/>
-        <c:majorGridlines/>
-        <c:majorTickMark val="out"/>
-        <c:minorTickMark val="none"/>
-        <c:tickLblPos val="nextTo"/>
-        <c:crossAx val="2118791784"/>
-        <c:crosses val="autoZero"/>
-      </c:valAx>
+        <c:dLbls>
+          <c:numFmt formatCode="0%" sourceLinked="0"/>
+          <c:dLblPos val="inEnd"/>
+          <c:showLegendKey val="0"/>
+          <c:showVal val="1"/>
+          <c:showCatName val="0"/>
+          <c:showSerName val="0"/>
+          <c:showPercent val="0"/>
+          <c:showBubbleSize val="0"/>
+          <c:showLeaderLines val="1"/>
+        </c:dLbls>
+      </c:pieChart>
     </c:plotArea>
     <c:legend>
-      <c:legendPos val="r"/>
-      <c:layout/>
+      <c:legendPos val="b"/>
       <c:overlay val="0"/>
     </c:legend>
-    <c:plotVisOnly val="1"/>
     <c:dispBlanksAs val="gap"/>
-    <c:showDLblsOverMax val="0"/>
   </c:chart>
   <c:txPr>
     <a:bodyPr/>
@@ -3613,6 +3438,1075 @@
             <a:spLocks noGrp="1"/>
           </p:cNvSpPr>
           <p:nvPr>
+            <p:ph type="ctrTitle"/>
+          </p:nvPr>
+        </p:nvSpPr>
+        <p:spPr/>
+        <p:txBody>
+          <a:bodyPr/>
+          <a:lstStyle/>
+          <a:p>
+            <a:r>
+              <a:t>PPT generation using python</a:t>
+            </a:r>
+          </a:p>
+        </p:txBody>
+      </p:sp>
+      <p:sp>
+        <p:nvSpPr>
+          <p:cNvPr id="3" name="Subtitle 2"/>
+          <p:cNvSpPr>
+            <a:spLocks noGrp="1"/>
+          </p:cNvSpPr>
+          <p:nvPr>
+            <p:ph type="subTitle" idx="1"/>
+          </p:nvPr>
+        </p:nvSpPr>
+        <p:spPr/>
+        <p:txBody>
+          <a:bodyPr/>
+          <a:lstStyle/>
+          <a:p>
+            <a:r>
+              <a:t>By Abhinav</a:t>
+            </a:r>
+          </a:p>
+        </p:txBody>
+      </p:sp>
+    </p:spTree>
+  </p:cSld>
+  <p:clrMapOvr>
+    <a:masterClrMapping/>
+  </p:clrMapOvr>
+</p:sld>
+</file>
+
+<file path=ppt/slides/slide2.xml><?xml version="1.0" encoding="utf-8"?>
+<p:sld xmlns:a="http://schemas.openxmlformats.org/drawingml/2006/main" xmlns:p="http://schemas.openxmlformats.org/presentationml/2006/main" xmlns:r="http://schemas.openxmlformats.org/officeDocument/2006/relationships">
+  <p:cSld>
+    <p:spTree>
+      <p:nvGrpSpPr>
+        <p:cNvPr id="1" name=""/>
+        <p:cNvGrpSpPr/>
+        <p:nvPr/>
+      </p:nvGrpSpPr>
+      <p:grpSpPr/>
+      <p:sp>
+        <p:nvSpPr>
+          <p:cNvPr id="2" name="TextBox 1"/>
+          <p:cNvSpPr txBox="1"/>
+          <p:nvPr/>
+        </p:nvSpPr>
+        <p:spPr>
+          <a:xfrm>
+            <a:off x="914400" y="1188720"/>
+            <a:ext cx="7315200" cy="6400800"/>
+          </a:xfrm>
+          <a:prstGeom prst="rect">
+            <a:avLst/>
+          </a:prstGeom>
+          <a:noFill/>
+        </p:spPr>
+        <p:txBody>
+          <a:bodyPr wrap="none">
+            <a:spAutoFit/>
+          </a:bodyPr>
+          <a:lstStyle/>
+          <a:p>
+            <a:r>
+              <a:t>This is text inside a textbox</a:t>
+            </a:r>
+          </a:p>
+          <a:p>
+            <a:pPr>
+              <a:defRPr b="1"/>
+            </a:pPr>
+            <a:r>
+              <a:t>This is a second paragraph that's bold</a:t>
+            </a:r>
+          </a:p>
+          <a:p>
+            <a:pPr>
+              <a:defRPr sz="4000"/>
+            </a:pPr>
+            <a:r>
+              <a:t>This is a third paragraph that's big</a:t>
+            </a:r>
+          </a:p>
+        </p:txBody>
+      </p:sp>
+    </p:spTree>
+  </p:cSld>
+  <p:clrMapOvr>
+    <a:masterClrMapping/>
+  </p:clrMapOvr>
+</p:sld>
+</file>
+
+<file path=ppt/slides/slide3.xml><?xml version="1.0" encoding="utf-8"?>
+<p:sld xmlns:a="http://schemas.openxmlformats.org/drawingml/2006/main" xmlns:p="http://schemas.openxmlformats.org/presentationml/2006/main" xmlns:r="http://schemas.openxmlformats.org/officeDocument/2006/relationships">
+  <p:cSld>
+    <p:spTree>
+      <p:nvGrpSpPr>
+        <p:cNvPr id="1" name=""/>
+        <p:cNvGrpSpPr/>
+        <p:nvPr/>
+      </p:nvGrpSpPr>
+      <p:grpSpPr/>
+      <p:sp>
+        <p:nvSpPr>
+          <p:cNvPr id="2" name="Title 1"/>
+          <p:cNvSpPr>
+            <a:spLocks noGrp="1"/>
+          </p:cNvSpPr>
+          <p:nvPr>
+            <p:ph type="title"/>
+          </p:nvPr>
+        </p:nvSpPr>
+        <p:spPr/>
+        <p:txBody>
+          <a:bodyPr/>
+          <a:lstStyle/>
+          <a:p>
+            <a:r>
+              <a:t>adding bullets</a:t>
+            </a:r>
+          </a:p>
+        </p:txBody>
+      </p:sp>
+      <p:sp>
+        <p:nvSpPr>
+          <p:cNvPr id="3" name="Content Placeholder 2"/>
+          <p:cNvSpPr>
+            <a:spLocks noGrp="1"/>
+          </p:cNvSpPr>
+          <p:nvPr>
+            <p:ph idx="1"/>
+          </p:nvPr>
+        </p:nvSpPr>
+        <p:spPr/>
+        <p:txBody>
+          <a:bodyPr/>
+          <a:lstStyle/>
+          <a:p>
+            <a:r>
+              <a:t>topic</a:t>
+            </a:r>
+          </a:p>
+          <a:p>
+            <a:pPr lvl="1"/>
+            <a:r>
+              <a:t>subtopic 1</a:t>
+            </a:r>
+          </a:p>
+          <a:p>
+            <a:pPr lvl="1"/>
+            <a:r>
+              <a:t>subtopic 2</a:t>
+            </a:r>
+          </a:p>
+        </p:txBody>
+      </p:sp>
+    </p:spTree>
+  </p:cSld>
+  <p:clrMapOvr>
+    <a:masterClrMapping/>
+  </p:clrMapOvr>
+</p:sld>
+</file>
+
+<file path=ppt/slides/slide4.xml><?xml version="1.0" encoding="utf-8"?>
+<p:sld xmlns:a="http://schemas.openxmlformats.org/drawingml/2006/main" xmlns:p="http://schemas.openxmlformats.org/presentationml/2006/main" xmlns:r="http://schemas.openxmlformats.org/officeDocument/2006/relationships">
+  <p:cSld>
+    <p:spTree>
+      <p:nvGrpSpPr>
+        <p:cNvPr id="1" name=""/>
+        <p:cNvGrpSpPr/>
+        <p:nvPr/>
+      </p:nvGrpSpPr>
+      <p:grpSpPr/>
+      <p:pic>
+        <p:nvPicPr>
+          <p:cNvPr id="2" name="Picture 1" descr="download.jpeg"/>
+          <p:cNvPicPr>
+            <a:picLocks noChangeAspect="1"/>
+          </p:cNvPicPr>
+          <p:nvPr/>
+        </p:nvPicPr>
+        <p:blipFill>
+          <a:blip r:embed="rId2"/>
+          <a:stretch>
+            <a:fillRect/>
+          </a:stretch>
+        </p:blipFill>
+        <p:spPr>
+          <a:xfrm>
+            <a:off x="914400" y="914400"/>
+            <a:ext cx="2857500" cy="2857500"/>
+          </a:xfrm>
+          <a:prstGeom prst="rect">
+            <a:avLst/>
+          </a:prstGeom>
+        </p:spPr>
+      </p:pic>
+      <p:pic>
+        <p:nvPicPr>
+          <p:cNvPr id="3" name="Picture 2" descr="download.jpeg"/>
+          <p:cNvPicPr>
+            <a:picLocks noChangeAspect="1"/>
+          </p:cNvPicPr>
+          <p:nvPr/>
+        </p:nvPicPr>
+        <p:blipFill>
+          <a:blip r:embed="rId2"/>
+          <a:stretch>
+            <a:fillRect/>
+          </a:stretch>
+        </p:blipFill>
+        <p:spPr>
+          <a:xfrm>
+            <a:off x="4572000" y="914400"/>
+            <a:ext cx="5029200" cy="5029200"/>
+          </a:xfrm>
+          <a:prstGeom prst="rect">
+            <a:avLst/>
+          </a:prstGeom>
+        </p:spPr>
+      </p:pic>
+    </p:spTree>
+  </p:cSld>
+  <p:clrMapOvr>
+    <a:masterClrMapping/>
+  </p:clrMapOvr>
+</p:sld>
+</file>
+
+<file path=ppt/slides/slide5.xml><?xml version="1.0" encoding="utf-8"?>
+<p:sld xmlns:a="http://schemas.openxmlformats.org/drawingml/2006/main" xmlns:p="http://schemas.openxmlformats.org/presentationml/2006/main" xmlns:r="http://schemas.openxmlformats.org/officeDocument/2006/relationships">
+  <p:cSld>
+    <p:spTree>
+      <p:nvGrpSpPr>
+        <p:cNvPr id="1" name=""/>
+        <p:cNvGrpSpPr/>
+        <p:nvPr/>
+      </p:nvGrpSpPr>
+      <p:grpSpPr/>
+      <p:sp>
+        <p:nvSpPr>
+          <p:cNvPr id="2" name="Title 1"/>
+          <p:cNvSpPr>
+            <a:spLocks noGrp="1"/>
+          </p:cNvSpPr>
+          <p:nvPr>
+            <p:ph type="title"/>
+          </p:nvPr>
+        </p:nvSpPr>
+        <p:spPr/>
+        <p:txBody>
+          <a:bodyPr/>
+          <a:lstStyle/>
+          <a:p>
+            <a:r>
+              <a:t>Adding a Table</a:t>
+            </a:r>
+          </a:p>
+        </p:txBody>
+      </p:sp>
+      <p:graphicFrame>
+        <p:nvGraphicFramePr>
+          <p:cNvPr id="3" name="Table 2"/>
+          <p:cNvGraphicFramePr>
+            <a:graphicFrameLocks noGrp="1"/>
+          </p:cNvGraphicFramePr>
+          <p:nvPr/>
+        </p:nvGraphicFramePr>
+        <p:xfrm>
+          <a:off x="1828800" y="1828800"/>
+          <a:ext cx="8229600" cy="731520"/>
+        </p:xfrm>
+        <a:graphic>
+          <a:graphicData uri="http://schemas.openxmlformats.org/drawingml/2006/table">
+            <a:tbl>
+              <a:tblPr firstRow="1" bandRow="1">
+                <a:tableStyleId>{5C22544A-7EE6-4342-B048-85BDC9FD1C3A}</a:tableStyleId>
+              </a:tblPr>
+              <a:tblGrid>
+                <a:gridCol w="1371600"/>
+                <a:gridCol w="1371600"/>
+                <a:gridCol w="1371600"/>
+                <a:gridCol w="1371600"/>
+                <a:gridCol w="1371600"/>
+                <a:gridCol w="1371600"/>
+              </a:tblGrid>
+              <a:tr h="73152">
+                <a:tc>
+                  <a:txBody>
+                    <a:bodyPr/>
+                    <a:lstStyle/>
+                    <a:p>
+                      <a:r>
+                        <a:t>student_id</a:t>
+                      </a:r>
+                    </a:p>
+                  </a:txBody>
+                  <a:tcPr/>
+                </a:tc>
+                <a:tc>
+                  <a:txBody>
+                    <a:bodyPr/>
+                    <a:lstStyle/>
+                    <a:p>
+                      <a:r>
+                        <a:t>f_name</a:t>
+                      </a:r>
+                    </a:p>
+                  </a:txBody>
+                  <a:tcPr/>
+                </a:tc>
+                <a:tc>
+                  <a:txBody>
+                    <a:bodyPr/>
+                    <a:lstStyle/>
+                    <a:p>
+                      <a:r>
+                        <a:t>l_name</a:t>
+                      </a:r>
+                    </a:p>
+                  </a:txBody>
+                  <a:tcPr/>
+                </a:tc>
+                <a:tc>
+                  <a:txBody>
+                    <a:bodyPr/>
+                    <a:lstStyle/>
+                    <a:p>
+                      <a:r>
+                        <a:t>roll_no</a:t>
+                      </a:r>
+                    </a:p>
+                  </a:txBody>
+                  <a:tcPr/>
+                </a:tc>
+                <a:tc>
+                  <a:txBody>
+                    <a:bodyPr/>
+                    <a:lstStyle/>
+                    <a:p>
+                      <a:r>
+                        <a:t>marks</a:t>
+                      </a:r>
+                    </a:p>
+                  </a:txBody>
+                  <a:tcPr/>
+                </a:tc>
+                <a:tc>
+                  <a:txBody>
+                    <a:bodyPr/>
+                    <a:lstStyle/>
+                    <a:p>
+                      <a:r>
+                        <a:t>project</a:t>
+                      </a:r>
+                    </a:p>
+                  </a:txBody>
+                  <a:tcPr/>
+                </a:tc>
+              </a:tr>
+              <a:tr h="73152">
+                <a:tc>
+                  <a:txBody>
+                    <a:bodyPr/>
+                    <a:lstStyle/>
+                    <a:p>
+                      <a:r>
+                        <a:t>1</a:t>
+                      </a:r>
+                    </a:p>
+                  </a:txBody>
+                  <a:tcPr/>
+                </a:tc>
+                <a:tc>
+                  <a:txBody>
+                    <a:bodyPr/>
+                    <a:lstStyle/>
+                    <a:p>
+                      <a:r>
+                        <a:t>Abhinav</a:t>
+                      </a:r>
+                    </a:p>
+                  </a:txBody>
+                  <a:tcPr/>
+                </a:tc>
+                <a:tc>
+                  <a:txBody>
+                    <a:bodyPr/>
+                    <a:lstStyle/>
+                    <a:p>
+                      <a:r>
+                        <a:t>kumar</a:t>
+                      </a:r>
+                    </a:p>
+                  </a:txBody>
+                  <a:tcPr/>
+                </a:tc>
+                <a:tc>
+                  <a:txBody>
+                    <a:bodyPr/>
+                    <a:lstStyle/>
+                    <a:p>
+                      <a:r>
+                        <a:t>1</a:t>
+                      </a:r>
+                    </a:p>
+                  </a:txBody>
+                  <a:tcPr/>
+                </a:tc>
+                <a:tc>
+                  <a:txBody>
+                    <a:bodyPr/>
+                    <a:lstStyle/>
+                    <a:p>
+                      <a:r>
+                        <a:t>79</a:t>
+                      </a:r>
+                    </a:p>
+                  </a:txBody>
+                  <a:tcPr/>
+                </a:tc>
+                <a:tc>
+                  <a:txBody>
+                    <a:bodyPr/>
+                    <a:lstStyle/>
+                    <a:p>
+                      <a:r>
+                        <a:t>4</a:t>
+                      </a:r>
+                    </a:p>
+                  </a:txBody>
+                  <a:tcPr/>
+                </a:tc>
+              </a:tr>
+              <a:tr h="73152">
+                <a:tc>
+                  <a:txBody>
+                    <a:bodyPr/>
+                    <a:lstStyle/>
+                    <a:p>
+                      <a:r>
+                        <a:t>2</a:t>
+                      </a:r>
+                    </a:p>
+                  </a:txBody>
+                  <a:tcPr/>
+                </a:tc>
+                <a:tc>
+                  <a:txBody>
+                    <a:bodyPr/>
+                    <a:lstStyle/>
+                    <a:p>
+                      <a:r>
+                        <a:t>Abhishek</a:t>
+                      </a:r>
+                    </a:p>
+                  </a:txBody>
+                  <a:tcPr/>
+                </a:tc>
+                <a:tc>
+                  <a:txBody>
+                    <a:bodyPr/>
+                    <a:lstStyle/>
+                    <a:p>
+                      <a:r>
+                        <a:t>kumar</a:t>
+                      </a:r>
+                    </a:p>
+                  </a:txBody>
+                  <a:tcPr/>
+                </a:tc>
+                <a:tc>
+                  <a:txBody>
+                    <a:bodyPr/>
+                    <a:lstStyle/>
+                    <a:p>
+                      <a:r>
+                        <a:t>2</a:t>
+                      </a:r>
+                    </a:p>
+                  </a:txBody>
+                  <a:tcPr/>
+                </a:tc>
+                <a:tc>
+                  <a:txBody>
+                    <a:bodyPr/>
+                    <a:lstStyle/>
+                    <a:p>
+                      <a:r>
+                        <a:t>54</a:t>
+                      </a:r>
+                    </a:p>
+                  </a:txBody>
+                  <a:tcPr/>
+                </a:tc>
+                <a:tc>
+                  <a:txBody>
+                    <a:bodyPr/>
+                    <a:lstStyle/>
+                    <a:p>
+                      <a:r>
+                        <a:t>4</a:t>
+                      </a:r>
+                    </a:p>
+                  </a:txBody>
+                  <a:tcPr/>
+                </a:tc>
+              </a:tr>
+              <a:tr h="73152">
+                <a:tc>
+                  <a:txBody>
+                    <a:bodyPr/>
+                    <a:lstStyle/>
+                    <a:p>
+                      <a:r>
+                        <a:t>3</a:t>
+                      </a:r>
+                    </a:p>
+                  </a:txBody>
+                  <a:tcPr/>
+                </a:tc>
+                <a:tc>
+                  <a:txBody>
+                    <a:bodyPr/>
+                    <a:lstStyle/>
+                    <a:p>
+                      <a:r>
+                        <a:t>Rohit</a:t>
+                      </a:r>
+                    </a:p>
+                  </a:txBody>
+                  <a:tcPr/>
+                </a:tc>
+                <a:tc>
+                  <a:txBody>
+                    <a:bodyPr/>
+                    <a:lstStyle/>
+                    <a:p>
+                      <a:r>
+                        <a:t>sharma</a:t>
+                      </a:r>
+                    </a:p>
+                  </a:txBody>
+                  <a:tcPr/>
+                </a:tc>
+                <a:tc>
+                  <a:txBody>
+                    <a:bodyPr/>
+                    <a:lstStyle/>
+                    <a:p>
+                      <a:r>
+                        <a:t>4</a:t>
+                      </a:r>
+                    </a:p>
+                  </a:txBody>
+                  <a:tcPr/>
+                </a:tc>
+                <a:tc>
+                  <a:txBody>
+                    <a:bodyPr/>
+                    <a:lstStyle/>
+                    <a:p>
+                      <a:r>
+                        <a:t>59</a:t>
+                      </a:r>
+                    </a:p>
+                  </a:txBody>
+                  <a:tcPr/>
+                </a:tc>
+                <a:tc>
+                  <a:txBody>
+                    <a:bodyPr/>
+                    <a:lstStyle/>
+                    <a:p>
+                      <a:r>
+                        <a:t>3</a:t>
+                      </a:r>
+                    </a:p>
+                  </a:txBody>
+                  <a:tcPr/>
+                </a:tc>
+              </a:tr>
+              <a:tr h="73152">
+                <a:tc>
+                  <a:txBody>
+                    <a:bodyPr/>
+                    <a:lstStyle/>
+                    <a:p>
+                      <a:r>
+                        <a:t>4</a:t>
+                      </a:r>
+                    </a:p>
+                  </a:txBody>
+                  <a:tcPr/>
+                </a:tc>
+                <a:tc>
+                  <a:txBody>
+                    <a:bodyPr/>
+                    <a:lstStyle/>
+                    <a:p>
+                      <a:r>
+                        <a:t>Nirbhay</a:t>
+                      </a:r>
+                    </a:p>
+                  </a:txBody>
+                  <a:tcPr/>
+                </a:tc>
+                <a:tc>
+                  <a:txBody>
+                    <a:bodyPr/>
+                    <a:lstStyle/>
+                    <a:p>
+                      <a:r>
+                        <a:t>Vashisht</a:t>
+                      </a:r>
+                    </a:p>
+                  </a:txBody>
+                  <a:tcPr/>
+                </a:tc>
+                <a:tc>
+                  <a:txBody>
+                    <a:bodyPr/>
+                    <a:lstStyle/>
+                    <a:p>
+                      <a:r>
+                        <a:t>6</a:t>
+                      </a:r>
+                    </a:p>
+                  </a:txBody>
+                  <a:tcPr/>
+                </a:tc>
+                <a:tc>
+                  <a:txBody>
+                    <a:bodyPr/>
+                    <a:lstStyle/>
+                    <a:p>
+                      <a:r>
+                        <a:t>82</a:t>
+                      </a:r>
+                    </a:p>
+                  </a:txBody>
+                  <a:tcPr/>
+                </a:tc>
+                <a:tc>
+                  <a:txBody>
+                    <a:bodyPr/>
+                    <a:lstStyle/>
+                    <a:p>
+                      <a:r>
+                        <a:t>3</a:t>
+                      </a:r>
+                    </a:p>
+                  </a:txBody>
+                  <a:tcPr/>
+                </a:tc>
+              </a:tr>
+              <a:tr h="73152">
+                <a:tc>
+                  <a:txBody>
+                    <a:bodyPr/>
+                    <a:lstStyle/>
+                    <a:p>
+                      <a:r>
+                        <a:t>5</a:t>
+                      </a:r>
+                    </a:p>
+                  </a:txBody>
+                  <a:tcPr/>
+                </a:tc>
+                <a:tc>
+                  <a:txBody>
+                    <a:bodyPr/>
+                    <a:lstStyle/>
+                    <a:p>
+                      <a:r>
+                        <a:t>Rishabh</a:t>
+                      </a:r>
+                    </a:p>
+                  </a:txBody>
+                  <a:tcPr/>
+                </a:tc>
+                <a:tc>
+                  <a:txBody>
+                    <a:bodyPr/>
+                    <a:lstStyle/>
+                    <a:p>
+                      <a:r>
+                        <a:t>kasana</a:t>
+                      </a:r>
+                    </a:p>
+                  </a:txBody>
+                  <a:tcPr/>
+                </a:tc>
+                <a:tc>
+                  <a:txBody>
+                    <a:bodyPr/>
+                    <a:lstStyle/>
+                    <a:p>
+                      <a:r>
+                        <a:t>7</a:t>
+                      </a:r>
+                    </a:p>
+                  </a:txBody>
+                  <a:tcPr/>
+                </a:tc>
+                <a:tc>
+                  <a:txBody>
+                    <a:bodyPr/>
+                    <a:lstStyle/>
+                    <a:p>
+                      <a:r>
+                        <a:t>79</a:t>
+                      </a:r>
+                    </a:p>
+                  </a:txBody>
+                  <a:tcPr/>
+                </a:tc>
+                <a:tc>
+                  <a:txBody>
+                    <a:bodyPr/>
+                    <a:lstStyle/>
+                    <a:p>
+                      <a:r>
+                        <a:t>2</a:t>
+                      </a:r>
+                    </a:p>
+                  </a:txBody>
+                  <a:tcPr/>
+                </a:tc>
+              </a:tr>
+              <a:tr h="73152">
+                <a:tc>
+                  <a:txBody>
+                    <a:bodyPr/>
+                    <a:lstStyle/>
+                    <a:p>
+                      <a:r>
+                        <a:t>6</a:t>
+                      </a:r>
+                    </a:p>
+                  </a:txBody>
+                  <a:tcPr/>
+                </a:tc>
+                <a:tc>
+                  <a:txBody>
+                    <a:bodyPr/>
+                    <a:lstStyle/>
+                    <a:p>
+                      <a:r>
+                        <a:t>Pavan</a:t>
+                      </a:r>
+                    </a:p>
+                  </a:txBody>
+                  <a:tcPr/>
+                </a:tc>
+                <a:tc>
+                  <a:txBody>
+                    <a:bodyPr/>
+                    <a:lstStyle/>
+                    <a:p>
+                      <a:r>
+                        <a:t>kumar</a:t>
+                      </a:r>
+                    </a:p>
+                  </a:txBody>
+                  <a:tcPr/>
+                </a:tc>
+                <a:tc>
+                  <a:txBody>
+                    <a:bodyPr/>
+                    <a:lstStyle/>
+                    <a:p>
+                      <a:r>
+                        <a:t>8</a:t>
+                      </a:r>
+                    </a:p>
+                  </a:txBody>
+                  <a:tcPr/>
+                </a:tc>
+                <a:tc>
+                  <a:txBody>
+                    <a:bodyPr/>
+                    <a:lstStyle/>
+                    <a:p>
+                      <a:r>
+                        <a:t>65</a:t>
+                      </a:r>
+                    </a:p>
+                  </a:txBody>
+                  <a:tcPr/>
+                </a:tc>
+                <a:tc>
+                  <a:txBody>
+                    <a:bodyPr/>
+                    <a:lstStyle/>
+                    <a:p>
+                      <a:r>
+                        <a:t>2</a:t>
+                      </a:r>
+                    </a:p>
+                  </a:txBody>
+                  <a:tcPr/>
+                </a:tc>
+              </a:tr>
+              <a:tr h="73152">
+                <a:tc>
+                  <a:txBody>
+                    <a:bodyPr/>
+                    <a:lstStyle/>
+                    <a:p>
+                      <a:r>
+                        <a:t>7</a:t>
+                      </a:r>
+                    </a:p>
+                  </a:txBody>
+                  <a:tcPr/>
+                </a:tc>
+                <a:tc>
+                  <a:txBody>
+                    <a:bodyPr/>
+                    <a:lstStyle/>
+                    <a:p>
+                      <a:r>
+                        <a:t>Ankur</a:t>
+                      </a:r>
+                    </a:p>
+                  </a:txBody>
+                  <a:tcPr/>
+                </a:tc>
+                <a:tc>
+                  <a:txBody>
+                    <a:bodyPr/>
+                    <a:lstStyle/>
+                    <a:p>
+                      <a:r>
+                        <a:t>garg</a:t>
+                      </a:r>
+                    </a:p>
+                  </a:txBody>
+                  <a:tcPr/>
+                </a:tc>
+                <a:tc>
+                  <a:txBody>
+                    <a:bodyPr/>
+                    <a:lstStyle/>
+                    <a:p>
+                      <a:r>
+                        <a:t>9</a:t>
+                      </a:r>
+                    </a:p>
+                  </a:txBody>
+                  <a:tcPr/>
+                </a:tc>
+                <a:tc>
+                  <a:txBody>
+                    <a:bodyPr/>
+                    <a:lstStyle/>
+                    <a:p>
+                      <a:r>
+                        <a:t>47</a:t>
+                      </a:r>
+                    </a:p>
+                  </a:txBody>
+                  <a:tcPr/>
+                </a:tc>
+                <a:tc>
+                  <a:txBody>
+                    <a:bodyPr/>
+                    <a:lstStyle/>
+                    <a:p>
+                      <a:r>
+                        <a:t>3</a:t>
+                      </a:r>
+                    </a:p>
+                  </a:txBody>
+                  <a:tcPr/>
+                </a:tc>
+              </a:tr>
+              <a:tr h="73152">
+                <a:tc>
+                  <a:txBody>
+                    <a:bodyPr/>
+                    <a:lstStyle/>
+                    <a:p>
+                      <a:r>
+                        <a:t>25</a:t>
+                      </a:r>
+                    </a:p>
+                  </a:txBody>
+                  <a:tcPr/>
+                </a:tc>
+                <a:tc>
+                  <a:txBody>
+                    <a:bodyPr/>
+                    <a:lstStyle/>
+                    <a:p>
+                      <a:r>
+                        <a:t>Abhay</a:t>
+                      </a:r>
+                    </a:p>
+                  </a:txBody>
+                  <a:tcPr/>
+                </a:tc>
+                <a:tc>
+                  <a:txBody>
+                    <a:bodyPr/>
+                    <a:lstStyle/>
+                    <a:p>
+                      <a:r>
+                        <a:t>Gupta</a:t>
+                      </a:r>
+                    </a:p>
+                  </a:txBody>
+                  <a:tcPr/>
+                </a:tc>
+                <a:tc>
+                  <a:txBody>
+                    <a:bodyPr/>
+                    <a:lstStyle/>
+                    <a:p>
+                      <a:r>
+                        <a:t>10</a:t>
+                      </a:r>
+                    </a:p>
+                  </a:txBody>
+                  <a:tcPr/>
+                </a:tc>
+                <a:tc>
+                  <a:txBody>
+                    <a:bodyPr/>
+                    <a:lstStyle/>
+                    <a:p>
+                      <a:r>
+                        <a:t>73</a:t>
+                      </a:r>
+                    </a:p>
+                  </a:txBody>
+                  <a:tcPr/>
+                </a:tc>
+                <a:tc>
+                  <a:txBody>
+                    <a:bodyPr/>
+                    <a:lstStyle/>
+                    <a:p>
+                      <a:r>
+                        <a:t>4</a:t>
+                      </a:r>
+                    </a:p>
+                  </a:txBody>
+                  <a:tcPr/>
+                </a:tc>
+              </a:tr>
+              <a:tr h="73152">
+                <a:tc>
+                  <a:txBody>
+                    <a:bodyPr/>
+                    <a:lstStyle/>
+                    <a:p>
+                      <a:r>
+                        <a:t>27</a:t>
+                      </a:r>
+                    </a:p>
+                  </a:txBody>
+                  <a:tcPr/>
+                </a:tc>
+                <a:tc>
+                  <a:txBody>
+                    <a:bodyPr/>
+                    <a:lstStyle/>
+                    <a:p>
+                      <a:r>
+                        <a:t>Shubham</a:t>
+                      </a:r>
+                    </a:p>
+                  </a:txBody>
+                  <a:tcPr/>
+                </a:tc>
+                <a:tc>
+                  <a:txBody>
+                    <a:bodyPr/>
+                    <a:lstStyle/>
+                    <a:p>
+                      <a:r>
+                        <a:t>chauhan</a:t>
+                      </a:r>
+                    </a:p>
+                  </a:txBody>
+                  <a:tcPr/>
+                </a:tc>
+                <a:tc>
+                  <a:txBody>
+                    <a:bodyPr/>
+                    <a:lstStyle/>
+                    <a:p>
+                      <a:r>
+                        <a:t>16</a:t>
+                      </a:r>
+                    </a:p>
+                  </a:txBody>
+                  <a:tcPr/>
+                </a:tc>
+                <a:tc>
+                  <a:txBody>
+                    <a:bodyPr/>
+                    <a:lstStyle/>
+                    <a:p>
+                      <a:r>
+                        <a:t>56</a:t>
+                      </a:r>
+                    </a:p>
+                  </a:txBody>
+                  <a:tcPr/>
+                </a:tc>
+                <a:tc>
+                  <a:txBody>
+                    <a:bodyPr/>
+                    <a:lstStyle/>
+                    <a:p>
+                      <a:r>
+                        <a:t>4</a:t>
+                      </a:r>
+                    </a:p>
+                  </a:txBody>
+                  <a:tcPr/>
+                </a:tc>
+              </a:tr>
+            </a:tbl>
+          </a:graphicData>
+        </a:graphic>
+      </p:graphicFrame>
+    </p:spTree>
+  </p:cSld>
+  <p:clrMapOvr>
+    <a:masterClrMapping/>
+  </p:clrMapOvr>
+</p:sld>
+</file>
+
+<file path=ppt/slides/slide6.xml><?xml version="1.0" encoding="utf-8"?>
+<p:sld xmlns:a="http://schemas.openxmlformats.org/drawingml/2006/main" xmlns:p="http://schemas.openxmlformats.org/presentationml/2006/main" xmlns:r="http://schemas.openxmlformats.org/officeDocument/2006/relationships">
+  <p:cSld>
+    <p:spTree>
+      <p:nvGrpSpPr>
+        <p:cNvPr id="1" name=""/>
+        <p:cNvGrpSpPr/>
+        <p:nvPr/>
+      </p:nvGrpSpPr>
+      <p:grpSpPr/>
+      <p:sp>
+        <p:nvSpPr>
+          <p:cNvPr id="2" name="Title 1"/>
+          <p:cNvSpPr>
+            <a:spLocks noGrp="1"/>
+          </p:cNvSpPr>
+          <p:nvPr>
             <p:ph type="title"/>
           </p:nvPr>
         </p:nvSpPr>
@@ -3645,9 +4539,48 @@
           </a:graphicData>
         </a:graphic>
       </p:graphicFrame>
+    </p:spTree>
+  </p:cSld>
+  <p:clrMapOvr>
+    <a:masterClrMapping/>
+  </p:clrMapOvr>
+</p:sld>
+</file>
+
+<file path=ppt/slides/slide7.xml><?xml version="1.0" encoding="utf-8"?>
+<p:sld xmlns:a="http://schemas.openxmlformats.org/drawingml/2006/main" xmlns:p="http://schemas.openxmlformats.org/presentationml/2006/main" xmlns:r="http://schemas.openxmlformats.org/officeDocument/2006/relationships">
+  <p:cSld>
+    <p:spTree>
+      <p:nvGrpSpPr>
+        <p:cNvPr id="1" name=""/>
+        <p:cNvGrpSpPr/>
+        <p:nvPr/>
+      </p:nvGrpSpPr>
+      <p:grpSpPr/>
+      <p:sp>
+        <p:nvSpPr>
+          <p:cNvPr id="2" name="Title 1"/>
+          <p:cNvSpPr>
+            <a:spLocks noGrp="1"/>
+          </p:cNvSpPr>
+          <p:nvPr>
+            <p:ph type="title"/>
+          </p:nvPr>
+        </p:nvSpPr>
+        <p:spPr/>
+        <p:txBody>
+          <a:bodyPr/>
+          <a:lstStyle/>
+          <a:p>
+            <a:r>
+              <a:t>Pie chart Representation</a:t>
+            </a:r>
+          </a:p>
+        </p:txBody>
+      </p:sp>
       <p:graphicFrame>
         <p:nvGraphicFramePr>
-          <p:cNvPr id="4" name="Chart 3"/>
+          <p:cNvPr id="3" name="Chart 2"/>
           <p:cNvGraphicFramePr>
             <a:graphicFrameLocks noGrp="1"/>
           </p:cNvGraphicFramePr>
@@ -3659,7 +4592,7 @@
         </p:xfrm>
         <a:graphic>
           <a:graphicData uri="http://schemas.openxmlformats.org/drawingml/2006/chart">
-            <c:chart xmlns:c="http://schemas.openxmlformats.org/drawingml/2006/chart" r:id="rId3"/>
+            <c:chart xmlns:c="http://schemas.openxmlformats.org/drawingml/2006/chart" r:id="rId2"/>
           </a:graphicData>
         </a:graphic>
       </p:graphicFrame>

</xml_diff>